<commit_message>
add all initial pages
</commit_message>
<xml_diff>
--- a/prototype/功能.pptx
+++ b/prototype/功能.pptx
@@ -5,10 +5,15 @@
     <p:sldMasterId id="2147483648" r:id="rId1"/>
   </p:sldMasterIdLst>
   <p:sldIdLst>
-    <p:sldId id="256" r:id="rId2"/>
-    <p:sldId id="257" r:id="rId3"/>
-    <p:sldId id="258" r:id="rId4"/>
-    <p:sldId id="259" r:id="rId5"/>
+    <p:sldId id="264" r:id="rId2"/>
+    <p:sldId id="256" r:id="rId3"/>
+    <p:sldId id="257" r:id="rId4"/>
+    <p:sldId id="258" r:id="rId5"/>
+    <p:sldId id="259" r:id="rId6"/>
+    <p:sldId id="260" r:id="rId7"/>
+    <p:sldId id="261" r:id="rId8"/>
+    <p:sldId id="262" r:id="rId9"/>
+    <p:sldId id="263" r:id="rId10"/>
   </p:sldIdLst>
   <p:sldSz cx="9144000" cy="6858000" type="screen4x3"/>
   <p:notesSz cx="6858000" cy="9144000"/>
@@ -107,6 +112,22 @@
       </a:defRPr>
     </a:lvl9pPr>
   </p:defaultTextStyle>
+  <p:extLst>
+    <p:ext uri="{EFAFB233-063F-42B5-8137-9DF3F51BA10A}">
+      <p15:sldGuideLst xmlns:p15="http://schemas.microsoft.com/office/powerpoint/2012/main">
+        <p15:guide id="1" orient="horz" pos="2160">
+          <p15:clr>
+            <a:srgbClr val="A4A3A4"/>
+          </p15:clr>
+        </p15:guide>
+        <p15:guide id="2" pos="2880">
+          <p15:clr>
+            <a:srgbClr val="A4A3A4"/>
+          </p15:clr>
+        </p15:guide>
+      </p15:sldGuideLst>
+    </p:ext>
+  </p:extLst>
 </p:presentation>
 </file>
 
@@ -148,10 +169,9 @@
           <a:lstStyle/>
           <a:p>
             <a:r>
-              <a:rPr lang="zh-CN" altLang="en-US" smtClean="0"/>
+              <a:rPr lang="zh-CN" altLang="en-US"/>
               <a:t>单击此处编辑母版标题样式</a:t>
             </a:r>
-            <a:endParaRPr lang="zh-CN" altLang="en-US"/>
           </a:p>
         </p:txBody>
       </p:sp>
@@ -267,10 +287,9 @@
           </a:lstStyle>
           <a:p>
             <a:r>
-              <a:rPr lang="zh-CN" altLang="en-US" smtClean="0"/>
+              <a:rPr lang="zh-CN" altLang="en-US"/>
               <a:t>单击此处编辑母版副标题样式</a:t>
             </a:r>
-            <a:endParaRPr lang="zh-CN" altLang="en-US"/>
           </a:p>
         </p:txBody>
       </p:sp>
@@ -291,7 +310,7 @@
           <a:p>
             <a:fld id="{49D02024-A00B-4BCF-9D35-54721944EE02}" type="datetimeFigureOut">
               <a:rPr lang="zh-CN" altLang="en-US" smtClean="0"/>
-              <a:t>2018/5/22</a:t>
+              <a:t>2018/5/23</a:t>
             </a:fld>
             <a:endParaRPr lang="zh-CN" altLang="en-US"/>
           </a:p>
@@ -385,10 +404,9 @@
           <a:lstStyle/>
           <a:p>
             <a:r>
-              <a:rPr lang="zh-CN" altLang="en-US" smtClean="0"/>
+              <a:rPr lang="zh-CN" altLang="en-US"/>
               <a:t>单击此处编辑母版标题样式</a:t>
             </a:r>
-            <a:endParaRPr lang="zh-CN" altLang="en-US"/>
           </a:p>
         </p:txBody>
       </p:sp>
@@ -409,38 +427,37 @@
           <a:p>
             <a:pPr lvl="0"/>
             <a:r>
-              <a:rPr lang="zh-CN" altLang="en-US" smtClean="0"/>
+              <a:rPr lang="zh-CN" altLang="en-US"/>
               <a:t>单击此处编辑母版文本样式</a:t>
             </a:r>
           </a:p>
           <a:p>
             <a:pPr lvl="1"/>
             <a:r>
-              <a:rPr lang="zh-CN" altLang="en-US" smtClean="0"/>
+              <a:rPr lang="zh-CN" altLang="en-US"/>
               <a:t>第二级</a:t>
             </a:r>
           </a:p>
           <a:p>
             <a:pPr lvl="2"/>
             <a:r>
-              <a:rPr lang="zh-CN" altLang="en-US" smtClean="0"/>
+              <a:rPr lang="zh-CN" altLang="en-US"/>
               <a:t>第三级</a:t>
             </a:r>
           </a:p>
           <a:p>
             <a:pPr lvl="3"/>
             <a:r>
-              <a:rPr lang="zh-CN" altLang="en-US" smtClean="0"/>
+              <a:rPr lang="zh-CN" altLang="en-US"/>
               <a:t>第四级</a:t>
             </a:r>
           </a:p>
           <a:p>
             <a:pPr lvl="4"/>
             <a:r>
-              <a:rPr lang="zh-CN" altLang="en-US" smtClean="0"/>
+              <a:rPr lang="zh-CN" altLang="en-US"/>
               <a:t>第五级</a:t>
             </a:r>
-            <a:endParaRPr lang="zh-CN" altLang="en-US"/>
           </a:p>
         </p:txBody>
       </p:sp>
@@ -461,7 +478,7 @@
           <a:p>
             <a:fld id="{49D02024-A00B-4BCF-9D35-54721944EE02}" type="datetimeFigureOut">
               <a:rPr lang="zh-CN" altLang="en-US" smtClean="0"/>
-              <a:t>2018/5/22</a:t>
+              <a:t>2018/5/23</a:t>
             </a:fld>
             <a:endParaRPr lang="zh-CN" altLang="en-US"/>
           </a:p>
@@ -560,10 +577,9 @@
           <a:lstStyle/>
           <a:p>
             <a:r>
-              <a:rPr lang="zh-CN" altLang="en-US" smtClean="0"/>
+              <a:rPr lang="zh-CN" altLang="en-US"/>
               <a:t>单击此处编辑母版标题样式</a:t>
             </a:r>
-            <a:endParaRPr lang="zh-CN" altLang="en-US"/>
           </a:p>
         </p:txBody>
       </p:sp>
@@ -589,38 +605,37 @@
           <a:p>
             <a:pPr lvl="0"/>
             <a:r>
-              <a:rPr lang="zh-CN" altLang="en-US" smtClean="0"/>
+              <a:rPr lang="zh-CN" altLang="en-US"/>
               <a:t>单击此处编辑母版文本样式</a:t>
             </a:r>
           </a:p>
           <a:p>
             <a:pPr lvl="1"/>
             <a:r>
-              <a:rPr lang="zh-CN" altLang="en-US" smtClean="0"/>
+              <a:rPr lang="zh-CN" altLang="en-US"/>
               <a:t>第二级</a:t>
             </a:r>
           </a:p>
           <a:p>
             <a:pPr lvl="2"/>
             <a:r>
-              <a:rPr lang="zh-CN" altLang="en-US" smtClean="0"/>
+              <a:rPr lang="zh-CN" altLang="en-US"/>
               <a:t>第三级</a:t>
             </a:r>
           </a:p>
           <a:p>
             <a:pPr lvl="3"/>
             <a:r>
-              <a:rPr lang="zh-CN" altLang="en-US" smtClean="0"/>
+              <a:rPr lang="zh-CN" altLang="en-US"/>
               <a:t>第四级</a:t>
             </a:r>
           </a:p>
           <a:p>
             <a:pPr lvl="4"/>
             <a:r>
-              <a:rPr lang="zh-CN" altLang="en-US" smtClean="0"/>
+              <a:rPr lang="zh-CN" altLang="en-US"/>
               <a:t>第五级</a:t>
             </a:r>
-            <a:endParaRPr lang="zh-CN" altLang="en-US"/>
           </a:p>
         </p:txBody>
       </p:sp>
@@ -641,7 +656,7 @@
           <a:p>
             <a:fld id="{49D02024-A00B-4BCF-9D35-54721944EE02}" type="datetimeFigureOut">
               <a:rPr lang="zh-CN" altLang="en-US" smtClean="0"/>
-              <a:t>2018/5/22</a:t>
+              <a:t>2018/5/23</a:t>
             </a:fld>
             <a:endParaRPr lang="zh-CN" altLang="en-US"/>
           </a:p>
@@ -735,10 +750,9 @@
           <a:lstStyle/>
           <a:p>
             <a:r>
-              <a:rPr lang="zh-CN" altLang="en-US" smtClean="0"/>
+              <a:rPr lang="zh-CN" altLang="en-US"/>
               <a:t>单击此处编辑母版标题样式</a:t>
             </a:r>
-            <a:endParaRPr lang="zh-CN" altLang="en-US"/>
           </a:p>
         </p:txBody>
       </p:sp>
@@ -759,38 +773,37 @@
           <a:p>
             <a:pPr lvl="0"/>
             <a:r>
-              <a:rPr lang="zh-CN" altLang="en-US" smtClean="0"/>
+              <a:rPr lang="zh-CN" altLang="en-US"/>
               <a:t>单击此处编辑母版文本样式</a:t>
             </a:r>
           </a:p>
           <a:p>
             <a:pPr lvl="1"/>
             <a:r>
-              <a:rPr lang="zh-CN" altLang="en-US" smtClean="0"/>
+              <a:rPr lang="zh-CN" altLang="en-US"/>
               <a:t>第二级</a:t>
             </a:r>
           </a:p>
           <a:p>
             <a:pPr lvl="2"/>
             <a:r>
-              <a:rPr lang="zh-CN" altLang="en-US" smtClean="0"/>
+              <a:rPr lang="zh-CN" altLang="en-US"/>
               <a:t>第三级</a:t>
             </a:r>
           </a:p>
           <a:p>
             <a:pPr lvl="3"/>
             <a:r>
-              <a:rPr lang="zh-CN" altLang="en-US" smtClean="0"/>
+              <a:rPr lang="zh-CN" altLang="en-US"/>
               <a:t>第四级</a:t>
             </a:r>
           </a:p>
           <a:p>
             <a:pPr lvl="4"/>
             <a:r>
-              <a:rPr lang="zh-CN" altLang="en-US" smtClean="0"/>
+              <a:rPr lang="zh-CN" altLang="en-US"/>
               <a:t>第五级</a:t>
             </a:r>
-            <a:endParaRPr lang="zh-CN" altLang="en-US"/>
           </a:p>
         </p:txBody>
       </p:sp>
@@ -811,7 +824,7 @@
           <a:p>
             <a:fld id="{49D02024-A00B-4BCF-9D35-54721944EE02}" type="datetimeFigureOut">
               <a:rPr lang="zh-CN" altLang="en-US" smtClean="0"/>
-              <a:t>2018/5/22</a:t>
+              <a:t>2018/5/23</a:t>
             </a:fld>
             <a:endParaRPr lang="zh-CN" altLang="en-US"/>
           </a:p>
@@ -914,10 +927,9 @@
           </a:lstStyle>
           <a:p>
             <a:r>
-              <a:rPr lang="zh-CN" altLang="en-US" smtClean="0"/>
+              <a:rPr lang="zh-CN" altLang="en-US"/>
               <a:t>单击此处编辑母版标题样式</a:t>
             </a:r>
-            <a:endParaRPr lang="zh-CN" altLang="en-US"/>
           </a:p>
         </p:txBody>
       </p:sp>
@@ -1034,7 +1046,7 @@
           <a:p>
             <a:pPr lvl="0"/>
             <a:r>
-              <a:rPr lang="zh-CN" altLang="en-US" smtClean="0"/>
+              <a:rPr lang="zh-CN" altLang="en-US"/>
               <a:t>单击此处编辑母版文本样式</a:t>
             </a:r>
           </a:p>
@@ -1057,7 +1069,7 @@
           <a:p>
             <a:fld id="{49D02024-A00B-4BCF-9D35-54721944EE02}" type="datetimeFigureOut">
               <a:rPr lang="zh-CN" altLang="en-US" smtClean="0"/>
-              <a:t>2018/5/22</a:t>
+              <a:t>2018/5/23</a:t>
             </a:fld>
             <a:endParaRPr lang="zh-CN" altLang="en-US"/>
           </a:p>
@@ -1151,10 +1163,9 @@
           <a:lstStyle/>
           <a:p>
             <a:r>
-              <a:rPr lang="zh-CN" altLang="en-US" smtClean="0"/>
+              <a:rPr lang="zh-CN" altLang="en-US"/>
               <a:t>单击此处编辑母版标题样式</a:t>
             </a:r>
-            <a:endParaRPr lang="zh-CN" altLang="en-US"/>
           </a:p>
         </p:txBody>
       </p:sp>
@@ -1208,38 +1219,37 @@
           <a:p>
             <a:pPr lvl="0"/>
             <a:r>
-              <a:rPr lang="zh-CN" altLang="en-US" smtClean="0"/>
+              <a:rPr lang="zh-CN" altLang="en-US"/>
               <a:t>单击此处编辑母版文本样式</a:t>
             </a:r>
           </a:p>
           <a:p>
             <a:pPr lvl="1"/>
             <a:r>
-              <a:rPr lang="zh-CN" altLang="en-US" smtClean="0"/>
+              <a:rPr lang="zh-CN" altLang="en-US"/>
               <a:t>第二级</a:t>
             </a:r>
           </a:p>
           <a:p>
             <a:pPr lvl="2"/>
             <a:r>
-              <a:rPr lang="zh-CN" altLang="en-US" smtClean="0"/>
+              <a:rPr lang="zh-CN" altLang="en-US"/>
               <a:t>第三级</a:t>
             </a:r>
           </a:p>
           <a:p>
             <a:pPr lvl="3"/>
             <a:r>
-              <a:rPr lang="zh-CN" altLang="en-US" smtClean="0"/>
+              <a:rPr lang="zh-CN" altLang="en-US"/>
               <a:t>第四级</a:t>
             </a:r>
           </a:p>
           <a:p>
             <a:pPr lvl="4"/>
             <a:r>
-              <a:rPr lang="zh-CN" altLang="en-US" smtClean="0"/>
+              <a:rPr lang="zh-CN" altLang="en-US"/>
               <a:t>第五级</a:t>
             </a:r>
-            <a:endParaRPr lang="zh-CN" altLang="en-US"/>
           </a:p>
         </p:txBody>
       </p:sp>
@@ -1293,38 +1303,37 @@
           <a:p>
             <a:pPr lvl="0"/>
             <a:r>
-              <a:rPr lang="zh-CN" altLang="en-US" smtClean="0"/>
+              <a:rPr lang="zh-CN" altLang="en-US"/>
               <a:t>单击此处编辑母版文本样式</a:t>
             </a:r>
           </a:p>
           <a:p>
             <a:pPr lvl="1"/>
             <a:r>
-              <a:rPr lang="zh-CN" altLang="en-US" smtClean="0"/>
+              <a:rPr lang="zh-CN" altLang="en-US"/>
               <a:t>第二级</a:t>
             </a:r>
           </a:p>
           <a:p>
             <a:pPr lvl="2"/>
             <a:r>
-              <a:rPr lang="zh-CN" altLang="en-US" smtClean="0"/>
+              <a:rPr lang="zh-CN" altLang="en-US"/>
               <a:t>第三级</a:t>
             </a:r>
           </a:p>
           <a:p>
             <a:pPr lvl="3"/>
             <a:r>
-              <a:rPr lang="zh-CN" altLang="en-US" smtClean="0"/>
+              <a:rPr lang="zh-CN" altLang="en-US"/>
               <a:t>第四级</a:t>
             </a:r>
           </a:p>
           <a:p>
             <a:pPr lvl="4"/>
             <a:r>
-              <a:rPr lang="zh-CN" altLang="en-US" smtClean="0"/>
+              <a:rPr lang="zh-CN" altLang="en-US"/>
               <a:t>第五级</a:t>
             </a:r>
-            <a:endParaRPr lang="zh-CN" altLang="en-US"/>
           </a:p>
         </p:txBody>
       </p:sp>
@@ -1345,7 +1354,7 @@
           <a:p>
             <a:fld id="{49D02024-A00B-4BCF-9D35-54721944EE02}" type="datetimeFigureOut">
               <a:rPr lang="zh-CN" altLang="en-US" smtClean="0"/>
-              <a:t>2018/5/22</a:t>
+              <a:t>2018/5/23</a:t>
             </a:fld>
             <a:endParaRPr lang="zh-CN" altLang="en-US"/>
           </a:p>
@@ -1443,10 +1452,9 @@
           </a:lstStyle>
           <a:p>
             <a:r>
-              <a:rPr lang="zh-CN" altLang="en-US" smtClean="0"/>
+              <a:rPr lang="zh-CN" altLang="en-US"/>
               <a:t>单击此处编辑母版标题样式</a:t>
             </a:r>
-            <a:endParaRPr lang="zh-CN" altLang="en-US"/>
           </a:p>
         </p:txBody>
       </p:sp>
@@ -1509,7 +1517,7 @@
           <a:p>
             <a:pPr lvl="0"/>
             <a:r>
-              <a:rPr lang="zh-CN" altLang="en-US" smtClean="0"/>
+              <a:rPr lang="zh-CN" altLang="en-US"/>
               <a:t>单击此处编辑母版文本样式</a:t>
             </a:r>
           </a:p>
@@ -1565,38 +1573,37 @@
           <a:p>
             <a:pPr lvl="0"/>
             <a:r>
-              <a:rPr lang="zh-CN" altLang="en-US" smtClean="0"/>
+              <a:rPr lang="zh-CN" altLang="en-US"/>
               <a:t>单击此处编辑母版文本样式</a:t>
             </a:r>
           </a:p>
           <a:p>
             <a:pPr lvl="1"/>
             <a:r>
-              <a:rPr lang="zh-CN" altLang="en-US" smtClean="0"/>
+              <a:rPr lang="zh-CN" altLang="en-US"/>
               <a:t>第二级</a:t>
             </a:r>
           </a:p>
           <a:p>
             <a:pPr lvl="2"/>
             <a:r>
-              <a:rPr lang="zh-CN" altLang="en-US" smtClean="0"/>
+              <a:rPr lang="zh-CN" altLang="en-US"/>
               <a:t>第三级</a:t>
             </a:r>
           </a:p>
           <a:p>
             <a:pPr lvl="3"/>
             <a:r>
-              <a:rPr lang="zh-CN" altLang="en-US" smtClean="0"/>
+              <a:rPr lang="zh-CN" altLang="en-US"/>
               <a:t>第四级</a:t>
             </a:r>
           </a:p>
           <a:p>
             <a:pPr lvl="4"/>
             <a:r>
-              <a:rPr lang="zh-CN" altLang="en-US" smtClean="0"/>
+              <a:rPr lang="zh-CN" altLang="en-US"/>
               <a:t>第五级</a:t>
             </a:r>
-            <a:endParaRPr lang="zh-CN" altLang="en-US"/>
           </a:p>
         </p:txBody>
       </p:sp>
@@ -1659,7 +1666,7 @@
           <a:p>
             <a:pPr lvl="0"/>
             <a:r>
-              <a:rPr lang="zh-CN" altLang="en-US" smtClean="0"/>
+              <a:rPr lang="zh-CN" altLang="en-US"/>
               <a:t>单击此处编辑母版文本样式</a:t>
             </a:r>
           </a:p>
@@ -1715,38 +1722,37 @@
           <a:p>
             <a:pPr lvl="0"/>
             <a:r>
-              <a:rPr lang="zh-CN" altLang="en-US" smtClean="0"/>
+              <a:rPr lang="zh-CN" altLang="en-US"/>
               <a:t>单击此处编辑母版文本样式</a:t>
             </a:r>
           </a:p>
           <a:p>
             <a:pPr lvl="1"/>
             <a:r>
-              <a:rPr lang="zh-CN" altLang="en-US" smtClean="0"/>
+              <a:rPr lang="zh-CN" altLang="en-US"/>
               <a:t>第二级</a:t>
             </a:r>
           </a:p>
           <a:p>
             <a:pPr lvl="2"/>
             <a:r>
-              <a:rPr lang="zh-CN" altLang="en-US" smtClean="0"/>
+              <a:rPr lang="zh-CN" altLang="en-US"/>
               <a:t>第三级</a:t>
             </a:r>
           </a:p>
           <a:p>
             <a:pPr lvl="3"/>
             <a:r>
-              <a:rPr lang="zh-CN" altLang="en-US" smtClean="0"/>
+              <a:rPr lang="zh-CN" altLang="en-US"/>
               <a:t>第四级</a:t>
             </a:r>
           </a:p>
           <a:p>
             <a:pPr lvl="4"/>
             <a:r>
-              <a:rPr lang="zh-CN" altLang="en-US" smtClean="0"/>
+              <a:rPr lang="zh-CN" altLang="en-US"/>
               <a:t>第五级</a:t>
             </a:r>
-            <a:endParaRPr lang="zh-CN" altLang="en-US"/>
           </a:p>
         </p:txBody>
       </p:sp>
@@ -1767,7 +1773,7 @@
           <a:p>
             <a:fld id="{49D02024-A00B-4BCF-9D35-54721944EE02}" type="datetimeFigureOut">
               <a:rPr lang="zh-CN" altLang="en-US" smtClean="0"/>
-              <a:t>2018/5/22</a:t>
+              <a:t>2018/5/23</a:t>
             </a:fld>
             <a:endParaRPr lang="zh-CN" altLang="en-US"/>
           </a:p>
@@ -1861,10 +1867,9 @@
           <a:lstStyle/>
           <a:p>
             <a:r>
-              <a:rPr lang="zh-CN" altLang="en-US" smtClean="0"/>
+              <a:rPr lang="zh-CN" altLang="en-US"/>
               <a:t>单击此处编辑母版标题样式</a:t>
             </a:r>
-            <a:endParaRPr lang="zh-CN" altLang="en-US"/>
           </a:p>
         </p:txBody>
       </p:sp>
@@ -1885,7 +1890,7 @@
           <a:p>
             <a:fld id="{49D02024-A00B-4BCF-9D35-54721944EE02}" type="datetimeFigureOut">
               <a:rPr lang="zh-CN" altLang="en-US" smtClean="0"/>
-              <a:t>2018/5/22</a:t>
+              <a:t>2018/5/23</a:t>
             </a:fld>
             <a:endParaRPr lang="zh-CN" altLang="en-US"/>
           </a:p>
@@ -1980,7 +1985,7 @@
           <a:p>
             <a:fld id="{49D02024-A00B-4BCF-9D35-54721944EE02}" type="datetimeFigureOut">
               <a:rPr lang="zh-CN" altLang="en-US" smtClean="0"/>
-              <a:t>2018/5/22</a:t>
+              <a:t>2018/5/23</a:t>
             </a:fld>
             <a:endParaRPr lang="zh-CN" altLang="en-US"/>
           </a:p>
@@ -2083,10 +2088,9 @@
           </a:lstStyle>
           <a:p>
             <a:r>
-              <a:rPr lang="zh-CN" altLang="en-US" smtClean="0"/>
+              <a:rPr lang="zh-CN" altLang="en-US"/>
               <a:t>单击此处编辑母版标题样式</a:t>
             </a:r>
-            <a:endParaRPr lang="zh-CN" altLang="en-US"/>
           </a:p>
         </p:txBody>
       </p:sp>
@@ -2140,38 +2144,37 @@
           <a:p>
             <a:pPr lvl="0"/>
             <a:r>
-              <a:rPr lang="zh-CN" altLang="en-US" smtClean="0"/>
+              <a:rPr lang="zh-CN" altLang="en-US"/>
               <a:t>单击此处编辑母版文本样式</a:t>
             </a:r>
           </a:p>
           <a:p>
             <a:pPr lvl="1"/>
             <a:r>
-              <a:rPr lang="zh-CN" altLang="en-US" smtClean="0"/>
+              <a:rPr lang="zh-CN" altLang="en-US"/>
               <a:t>第二级</a:t>
             </a:r>
           </a:p>
           <a:p>
             <a:pPr lvl="2"/>
             <a:r>
-              <a:rPr lang="zh-CN" altLang="en-US" smtClean="0"/>
+              <a:rPr lang="zh-CN" altLang="en-US"/>
               <a:t>第三级</a:t>
             </a:r>
           </a:p>
           <a:p>
             <a:pPr lvl="3"/>
             <a:r>
-              <a:rPr lang="zh-CN" altLang="en-US" smtClean="0"/>
+              <a:rPr lang="zh-CN" altLang="en-US"/>
               <a:t>第四级</a:t>
             </a:r>
           </a:p>
           <a:p>
             <a:pPr lvl="4"/>
             <a:r>
-              <a:rPr lang="zh-CN" altLang="en-US" smtClean="0"/>
+              <a:rPr lang="zh-CN" altLang="en-US"/>
               <a:t>第五级</a:t>
             </a:r>
-            <a:endParaRPr lang="zh-CN" altLang="en-US"/>
           </a:p>
         </p:txBody>
       </p:sp>
@@ -2234,7 +2237,7 @@
           <a:p>
             <a:pPr lvl="0"/>
             <a:r>
-              <a:rPr lang="zh-CN" altLang="en-US" smtClean="0"/>
+              <a:rPr lang="zh-CN" altLang="en-US"/>
               <a:t>单击此处编辑母版文本样式</a:t>
             </a:r>
           </a:p>
@@ -2257,7 +2260,7 @@
           <a:p>
             <a:fld id="{49D02024-A00B-4BCF-9D35-54721944EE02}" type="datetimeFigureOut">
               <a:rPr lang="zh-CN" altLang="en-US" smtClean="0"/>
-              <a:t>2018/5/22</a:t>
+              <a:t>2018/5/23</a:t>
             </a:fld>
             <a:endParaRPr lang="zh-CN" altLang="en-US"/>
           </a:p>
@@ -2360,10 +2363,9 @@
           </a:lstStyle>
           <a:p>
             <a:r>
-              <a:rPr lang="zh-CN" altLang="en-US" smtClean="0"/>
+              <a:rPr lang="zh-CN" altLang="en-US"/>
               <a:t>单击此处编辑母版标题样式</a:t>
             </a:r>
-            <a:endParaRPr lang="zh-CN" altLang="en-US"/>
           </a:p>
         </p:txBody>
       </p:sp>
@@ -2487,7 +2489,7 @@
           <a:p>
             <a:pPr lvl="0"/>
             <a:r>
-              <a:rPr lang="zh-CN" altLang="en-US" smtClean="0"/>
+              <a:rPr lang="zh-CN" altLang="en-US"/>
               <a:t>单击此处编辑母版文本样式</a:t>
             </a:r>
           </a:p>
@@ -2510,7 +2512,7 @@
           <a:p>
             <a:fld id="{49D02024-A00B-4BCF-9D35-54721944EE02}" type="datetimeFigureOut">
               <a:rPr lang="zh-CN" altLang="en-US" smtClean="0"/>
-              <a:t>2018/5/22</a:t>
+              <a:t>2018/5/23</a:t>
             </a:fld>
             <a:endParaRPr lang="zh-CN" altLang="en-US"/>
           </a:p>
@@ -2619,10 +2621,9 @@
           <a:lstStyle/>
           <a:p>
             <a:r>
-              <a:rPr lang="zh-CN" altLang="en-US" smtClean="0"/>
+              <a:rPr lang="zh-CN" altLang="en-US"/>
               <a:t>单击此处编辑母版标题样式</a:t>
             </a:r>
-            <a:endParaRPr lang="zh-CN" altLang="en-US"/>
           </a:p>
         </p:txBody>
       </p:sp>
@@ -2653,38 +2654,37 @@
           <a:p>
             <a:pPr lvl="0"/>
             <a:r>
-              <a:rPr lang="zh-CN" altLang="en-US" smtClean="0"/>
+              <a:rPr lang="zh-CN" altLang="en-US"/>
               <a:t>单击此处编辑母版文本样式</a:t>
             </a:r>
           </a:p>
           <a:p>
             <a:pPr lvl="1"/>
             <a:r>
-              <a:rPr lang="zh-CN" altLang="en-US" smtClean="0"/>
+              <a:rPr lang="zh-CN" altLang="en-US"/>
               <a:t>第二级</a:t>
             </a:r>
           </a:p>
           <a:p>
             <a:pPr lvl="2"/>
             <a:r>
-              <a:rPr lang="zh-CN" altLang="en-US" smtClean="0"/>
+              <a:rPr lang="zh-CN" altLang="en-US"/>
               <a:t>第三级</a:t>
             </a:r>
           </a:p>
           <a:p>
             <a:pPr lvl="3"/>
             <a:r>
-              <a:rPr lang="zh-CN" altLang="en-US" smtClean="0"/>
+              <a:rPr lang="zh-CN" altLang="en-US"/>
               <a:t>第四级</a:t>
             </a:r>
           </a:p>
           <a:p>
             <a:pPr lvl="4"/>
             <a:r>
-              <a:rPr lang="zh-CN" altLang="en-US" smtClean="0"/>
+              <a:rPr lang="zh-CN" altLang="en-US"/>
               <a:t>第五级</a:t>
             </a:r>
-            <a:endParaRPr lang="zh-CN" altLang="en-US"/>
           </a:p>
         </p:txBody>
       </p:sp>
@@ -2723,7 +2723,7 @@
           <a:p>
             <a:fld id="{49D02024-A00B-4BCF-9D35-54721944EE02}" type="datetimeFigureOut">
               <a:rPr lang="zh-CN" altLang="en-US" smtClean="0"/>
-              <a:t>2018/5/22</a:t>
+              <a:t>2018/5/23</a:t>
             </a:fld>
             <a:endParaRPr lang="zh-CN" altLang="en-US"/>
           </a:p>
@@ -3100,6 +3100,96 @@
       </p:grpSpPr>
       <p:sp>
         <p:nvSpPr>
+          <p:cNvPr id="2" name="标题 1">
+            <a:extLst>
+              <a:ext uri="{FF2B5EF4-FFF2-40B4-BE49-F238E27FC236}">
+                <a16:creationId xmlns:a16="http://schemas.microsoft.com/office/drawing/2014/main" id="{3A6D43D5-1C67-40A8-AC8F-F16854360C87}"/>
+              </a:ext>
+            </a:extLst>
+          </p:cNvPr>
+          <p:cNvSpPr>
+            <a:spLocks noGrp="1"/>
+          </p:cNvSpPr>
+          <p:nvPr>
+            <p:ph type="title"/>
+          </p:nvPr>
+        </p:nvSpPr>
+        <p:spPr/>
+        <p:txBody>
+          <a:bodyPr/>
+          <a:lstStyle/>
+          <a:p>
+            <a:endParaRPr lang="zh-CN" altLang="en-US"/>
+          </a:p>
+        </p:txBody>
+      </p:sp>
+      <p:pic>
+        <p:nvPicPr>
+          <p:cNvPr id="5" name="内容占位符 4">
+            <a:extLst>
+              <a:ext uri="{FF2B5EF4-FFF2-40B4-BE49-F238E27FC236}">
+                <a16:creationId xmlns:a16="http://schemas.microsoft.com/office/drawing/2014/main" id="{9D18CE41-8DE2-46FF-9DFD-BDAC0C6C026C}"/>
+              </a:ext>
+            </a:extLst>
+          </p:cNvPr>
+          <p:cNvPicPr>
+            <a:picLocks noGrp="1" noChangeAspect="1"/>
+          </p:cNvPicPr>
+          <p:nvPr>
+            <p:ph idx="1"/>
+          </p:nvPr>
+        </p:nvPicPr>
+        <p:blipFill>
+          <a:blip r:embed="rId2" cstate="print">
+            <a:extLst>
+              <a:ext uri="{28A0092B-C50C-407E-A947-70E740481C1C}">
+                <a14:useLocalDpi xmlns:a14="http://schemas.microsoft.com/office/drawing/2010/main" val="0"/>
+              </a:ext>
+            </a:extLst>
+          </a:blip>
+          <a:stretch>
+            <a:fillRect/>
+          </a:stretch>
+        </p:blipFill>
+        <p:spPr>
+          <a:xfrm>
+            <a:off x="323528" y="404664"/>
+            <a:ext cx="2952328" cy="5251209"/>
+          </a:xfrm>
+        </p:spPr>
+      </p:pic>
+    </p:spTree>
+    <p:extLst>
+      <p:ext uri="{BB962C8B-B14F-4D97-AF65-F5344CB8AC3E}">
+        <p14:creationId xmlns:p14="http://schemas.microsoft.com/office/powerpoint/2010/main" val="1335173284"/>
+      </p:ext>
+    </p:extLst>
+  </p:cSld>
+  <p:clrMapOvr>
+    <a:masterClrMapping/>
+  </p:clrMapOvr>
+</p:sld>
+</file>
+
+<file path=ppt/slides/slide2.xml><?xml version="1.0" encoding="utf-8"?>
+<p:sld xmlns:a="http://schemas.openxmlformats.org/drawingml/2006/main" xmlns:r="http://schemas.openxmlformats.org/officeDocument/2006/relationships" xmlns:p="http://schemas.openxmlformats.org/presentationml/2006/main">
+  <p:cSld>
+    <p:spTree>
+      <p:nvGrpSpPr>
+        <p:cNvPr id="1" name=""/>
+        <p:cNvGrpSpPr/>
+        <p:nvPr/>
+      </p:nvGrpSpPr>
+      <p:grpSpPr>
+        <a:xfrm>
+          <a:off x="0" y="0"/>
+          <a:ext cx="0" cy="0"/>
+          <a:chOff x="0" y="0"/>
+          <a:chExt cx="0" cy="0"/>
+        </a:xfrm>
+      </p:grpSpPr>
+      <p:sp>
+        <p:nvSpPr>
           <p:cNvPr id="5" name="TextBox 4"/>
           <p:cNvSpPr txBox="1"/>
           <p:nvPr/>
@@ -3121,27 +3211,27 @@
           <a:lstStyle/>
           <a:p>
             <a:r>
-              <a:rPr lang="zh-CN" altLang="en-US" dirty="0" smtClean="0"/>
+              <a:rPr lang="zh-CN" altLang="en-US" dirty="0"/>
               <a:t>我同意上述条款   </a:t>
             </a:r>
             <a:r>
-              <a:rPr lang="en-US" altLang="zh-CN" dirty="0" smtClean="0"/>
+              <a:rPr lang="en-US" altLang="zh-CN" dirty="0"/>
               <a:t>checkbox  </a:t>
             </a:r>
             <a:r>
-              <a:rPr lang="zh-CN" altLang="en-US" dirty="0" smtClean="0"/>
+              <a:rPr lang="zh-CN" altLang="en-US" dirty="0"/>
               <a:t>绑定</a:t>
             </a:r>
             <a:r>
-              <a:rPr lang="en-US" altLang="zh-CN" dirty="0" smtClean="0"/>
+              <a:rPr lang="en-US" altLang="zh-CN" dirty="0"/>
               <a:t>bool</a:t>
             </a:r>
             <a:r>
-              <a:rPr lang="zh-CN" altLang="en-US" dirty="0" smtClean="0"/>
+              <a:rPr lang="zh-CN" altLang="en-US" dirty="0"/>
               <a:t>变量</a:t>
             </a:r>
             <a:r>
-              <a:rPr lang="en-US" altLang="zh-CN" dirty="0" smtClean="0"/>
+              <a:rPr lang="en-US" altLang="zh-CN" dirty="0"/>
               <a:t>isAgreeChecked</a:t>
             </a:r>
           </a:p>
@@ -3150,11 +3240,11 @@
           </a:p>
           <a:p>
             <a:r>
-              <a:rPr lang="zh-CN" altLang="en-US" dirty="0" smtClean="0"/>
+              <a:rPr lang="zh-CN" altLang="en-US" dirty="0"/>
               <a:t>开始预约， 检测</a:t>
             </a:r>
             <a:r>
-              <a:rPr lang="en-US" altLang="zh-CN" dirty="0" smtClean="0"/>
+              <a:rPr lang="en-US" altLang="zh-CN" dirty="0"/>
               <a:t>isAgreeChecked</a:t>
             </a:r>
           </a:p>
@@ -3163,18 +3253,18 @@
           </a:p>
           <a:p>
             <a:r>
-              <a:rPr lang="zh-CN" altLang="en-US" dirty="0" smtClean="0"/>
+              <a:rPr lang="zh-CN" altLang="en-US" dirty="0"/>
               <a:t>我的订单</a:t>
             </a:r>
             <a:r>
-              <a:rPr lang="en-US" altLang="zh-CN" dirty="0" smtClean="0"/>
+              <a:rPr lang="en-US" altLang="zh-CN" dirty="0"/>
               <a:t>,    </a:t>
             </a:r>
             <a:r>
-              <a:rPr lang="zh-CN" altLang="en-US" dirty="0" smtClean="0"/>
+              <a:rPr lang="zh-CN" altLang="en-US" dirty="0"/>
               <a:t>显示本人订单</a:t>
             </a:r>
-            <a:endParaRPr lang="en-US" altLang="zh-CN" dirty="0" smtClean="0"/>
+            <a:endParaRPr lang="en-US" altLang="zh-CN" dirty="0"/>
           </a:p>
         </p:txBody>
       </p:sp>
@@ -3221,7 +3311,7 @@
 </p:sld>
 </file>
 
-<file path=ppt/slides/slide2.xml><?xml version="1.0" encoding="utf-8"?>
+<file path=ppt/slides/slide3.xml><?xml version="1.0" encoding="utf-8"?>
 <p:sld xmlns:a="http://schemas.openxmlformats.org/drawingml/2006/main" xmlns:r="http://schemas.openxmlformats.org/officeDocument/2006/relationships" xmlns:p="http://schemas.openxmlformats.org/presentationml/2006/main">
   <p:cSld>
     <p:spTree>
@@ -3299,7 +3389,7 @@
 </p:sld>
 </file>
 
-<file path=ppt/slides/slide3.xml><?xml version="1.0" encoding="utf-8"?>
+<file path=ppt/slides/slide4.xml><?xml version="1.0" encoding="utf-8"?>
 <p:sld xmlns:a="http://schemas.openxmlformats.org/drawingml/2006/main" xmlns:r="http://schemas.openxmlformats.org/officeDocument/2006/relationships" xmlns:p="http://schemas.openxmlformats.org/presentationml/2006/main">
   <p:cSld>
     <p:spTree>
@@ -3377,7 +3467,7 @@
 </p:sld>
 </file>
 
-<file path=ppt/slides/slide4.xml><?xml version="1.0" encoding="utf-8"?>
+<file path=ppt/slides/slide5.xml><?xml version="1.0" encoding="utf-8"?>
 <p:sld xmlns:a="http://schemas.openxmlformats.org/drawingml/2006/main" xmlns:r="http://schemas.openxmlformats.org/officeDocument/2006/relationships" xmlns:p="http://schemas.openxmlformats.org/presentationml/2006/main">
   <p:cSld>
     <p:spTree>
@@ -3442,10 +3532,412 @@
           </a:xfrm>
         </p:spPr>
       </p:pic>
+      <p:sp>
+        <p:nvSpPr>
+          <p:cNvPr id="3" name="文本框 2">
+            <a:extLst>
+              <a:ext uri="{FF2B5EF4-FFF2-40B4-BE49-F238E27FC236}">
+                <a16:creationId xmlns:a16="http://schemas.microsoft.com/office/drawing/2014/main" id="{F690D196-8FC3-41A1-88A4-E60F8C56E9FB}"/>
+              </a:ext>
+            </a:extLst>
+          </p:cNvPr>
+          <p:cNvSpPr txBox="1"/>
+          <p:nvPr/>
+        </p:nvSpPr>
+        <p:spPr>
+          <a:xfrm>
+            <a:off x="4932040" y="1988840"/>
+            <a:ext cx="3456384" cy="1200329"/>
+          </a:xfrm>
+          <a:prstGeom prst="rect">
+            <a:avLst/>
+          </a:prstGeom>
+          <a:noFill/>
+        </p:spPr>
+        <p:txBody>
+          <a:bodyPr wrap="square" rtlCol="0">
+            <a:spAutoFit/>
+          </a:bodyPr>
+          <a:lstStyle/>
+          <a:p>
+            <a:r>
+              <a:rPr lang="zh-CN" altLang="en-US" dirty="0"/>
+              <a:t>这里点击不同的服务会跳转到不同的画面</a:t>
+            </a:r>
+            <a:endParaRPr lang="en-US" altLang="zh-CN" dirty="0"/>
+          </a:p>
+          <a:p>
+            <a:endParaRPr lang="en-US" altLang="zh-CN" dirty="0"/>
+          </a:p>
+          <a:p>
+            <a:endParaRPr lang="zh-CN" altLang="en-US" dirty="0"/>
+          </a:p>
+        </p:txBody>
+      </p:sp>
     </p:spTree>
     <p:extLst>
       <p:ext uri="{BB962C8B-B14F-4D97-AF65-F5344CB8AC3E}">
         <p14:creationId xmlns:p14="http://schemas.microsoft.com/office/powerpoint/2010/main" val="3326969047"/>
+      </p:ext>
+    </p:extLst>
+  </p:cSld>
+  <p:clrMapOvr>
+    <a:masterClrMapping/>
+  </p:clrMapOvr>
+</p:sld>
+</file>
+
+<file path=ppt/slides/slide6.xml><?xml version="1.0" encoding="utf-8"?>
+<p:sld xmlns:a="http://schemas.openxmlformats.org/drawingml/2006/main" xmlns:r="http://schemas.openxmlformats.org/officeDocument/2006/relationships" xmlns:p="http://schemas.openxmlformats.org/presentationml/2006/main">
+  <p:cSld>
+    <p:spTree>
+      <p:nvGrpSpPr>
+        <p:cNvPr id="1" name=""/>
+        <p:cNvGrpSpPr/>
+        <p:nvPr/>
+      </p:nvGrpSpPr>
+      <p:grpSpPr>
+        <a:xfrm>
+          <a:off x="0" y="0"/>
+          <a:ext cx="0" cy="0"/>
+          <a:chOff x="0" y="0"/>
+          <a:chExt cx="0" cy="0"/>
+        </a:xfrm>
+      </p:grpSpPr>
+      <p:sp>
+        <p:nvSpPr>
+          <p:cNvPr id="2" name="标题 1">
+            <a:extLst>
+              <a:ext uri="{FF2B5EF4-FFF2-40B4-BE49-F238E27FC236}">
+                <a16:creationId xmlns:a16="http://schemas.microsoft.com/office/drawing/2014/main" id="{B54E3392-8812-45F6-B626-7F925D8E161B}"/>
+              </a:ext>
+            </a:extLst>
+          </p:cNvPr>
+          <p:cNvSpPr>
+            <a:spLocks noGrp="1"/>
+          </p:cNvSpPr>
+          <p:nvPr>
+            <p:ph type="title"/>
+          </p:nvPr>
+        </p:nvSpPr>
+        <p:spPr/>
+        <p:txBody>
+          <a:bodyPr/>
+          <a:lstStyle/>
+          <a:p>
+            <a:endParaRPr lang="zh-CN" altLang="en-US"/>
+          </a:p>
+        </p:txBody>
+      </p:sp>
+      <p:pic>
+        <p:nvPicPr>
+          <p:cNvPr id="5" name="内容占位符 4">
+            <a:extLst>
+              <a:ext uri="{FF2B5EF4-FFF2-40B4-BE49-F238E27FC236}">
+                <a16:creationId xmlns:a16="http://schemas.microsoft.com/office/drawing/2014/main" id="{FA87D36D-A824-4F9B-B4AA-777A619DA72E}"/>
+              </a:ext>
+            </a:extLst>
+          </p:cNvPr>
+          <p:cNvPicPr>
+            <a:picLocks noGrp="1" noChangeAspect="1"/>
+          </p:cNvPicPr>
+          <p:nvPr>
+            <p:ph idx="1"/>
+          </p:nvPr>
+        </p:nvPicPr>
+        <p:blipFill>
+          <a:blip r:embed="rId2">
+            <a:extLst>
+              <a:ext uri="{28A0092B-C50C-407E-A947-70E740481C1C}">
+                <a14:useLocalDpi xmlns:a14="http://schemas.microsoft.com/office/drawing/2010/main" val="0"/>
+              </a:ext>
+            </a:extLst>
+          </a:blip>
+          <a:stretch>
+            <a:fillRect/>
+          </a:stretch>
+        </p:blipFill>
+        <p:spPr>
+          <a:xfrm>
+            <a:off x="457200" y="274638"/>
+            <a:ext cx="3257218" cy="5793507"/>
+          </a:xfrm>
+        </p:spPr>
+      </p:pic>
+    </p:spTree>
+    <p:extLst>
+      <p:ext uri="{BB962C8B-B14F-4D97-AF65-F5344CB8AC3E}">
+        <p14:creationId xmlns:p14="http://schemas.microsoft.com/office/powerpoint/2010/main" val="2120468331"/>
+      </p:ext>
+    </p:extLst>
+  </p:cSld>
+  <p:clrMapOvr>
+    <a:masterClrMapping/>
+  </p:clrMapOvr>
+</p:sld>
+</file>
+
+<file path=ppt/slides/slide7.xml><?xml version="1.0" encoding="utf-8"?>
+<p:sld xmlns:a="http://schemas.openxmlformats.org/drawingml/2006/main" xmlns:r="http://schemas.openxmlformats.org/officeDocument/2006/relationships" xmlns:p="http://schemas.openxmlformats.org/presentationml/2006/main">
+  <p:cSld>
+    <p:spTree>
+      <p:nvGrpSpPr>
+        <p:cNvPr id="1" name=""/>
+        <p:cNvGrpSpPr/>
+        <p:nvPr/>
+      </p:nvGrpSpPr>
+      <p:grpSpPr>
+        <a:xfrm>
+          <a:off x="0" y="0"/>
+          <a:ext cx="0" cy="0"/>
+          <a:chOff x="0" y="0"/>
+          <a:chExt cx="0" cy="0"/>
+        </a:xfrm>
+      </p:grpSpPr>
+      <p:sp>
+        <p:nvSpPr>
+          <p:cNvPr id="2" name="标题 1">
+            <a:extLst>
+              <a:ext uri="{FF2B5EF4-FFF2-40B4-BE49-F238E27FC236}">
+                <a16:creationId xmlns:a16="http://schemas.microsoft.com/office/drawing/2014/main" id="{A2BCF3DD-7379-43FC-AD94-585A922EF23F}"/>
+              </a:ext>
+            </a:extLst>
+          </p:cNvPr>
+          <p:cNvSpPr>
+            <a:spLocks noGrp="1"/>
+          </p:cNvSpPr>
+          <p:nvPr>
+            <p:ph type="title"/>
+          </p:nvPr>
+        </p:nvSpPr>
+        <p:spPr/>
+        <p:txBody>
+          <a:bodyPr/>
+          <a:lstStyle/>
+          <a:p>
+            <a:endParaRPr lang="zh-CN" altLang="en-US"/>
+          </a:p>
+        </p:txBody>
+      </p:sp>
+      <p:pic>
+        <p:nvPicPr>
+          <p:cNvPr id="5" name="内容占位符 4">
+            <a:extLst>
+              <a:ext uri="{FF2B5EF4-FFF2-40B4-BE49-F238E27FC236}">
+                <a16:creationId xmlns:a16="http://schemas.microsoft.com/office/drawing/2014/main" id="{6CF3DAF4-4B11-4625-B42A-75904E479780}"/>
+              </a:ext>
+            </a:extLst>
+          </p:cNvPr>
+          <p:cNvPicPr>
+            <a:picLocks noGrp="1" noChangeAspect="1"/>
+          </p:cNvPicPr>
+          <p:nvPr>
+            <p:ph idx="1"/>
+          </p:nvPr>
+        </p:nvPicPr>
+        <p:blipFill>
+          <a:blip r:embed="rId2" cstate="print">
+            <a:extLst>
+              <a:ext uri="{28A0092B-C50C-407E-A947-70E740481C1C}">
+                <a14:useLocalDpi xmlns:a14="http://schemas.microsoft.com/office/drawing/2010/main" val="0"/>
+              </a:ext>
+            </a:extLst>
+          </a:blip>
+          <a:stretch>
+            <a:fillRect/>
+          </a:stretch>
+        </p:blipFill>
+        <p:spPr>
+          <a:xfrm>
+            <a:off x="3299709" y="1600200"/>
+            <a:ext cx="2544581" cy="4525963"/>
+          </a:xfrm>
+        </p:spPr>
+      </p:pic>
+    </p:spTree>
+    <p:extLst>
+      <p:ext uri="{BB962C8B-B14F-4D97-AF65-F5344CB8AC3E}">
+        <p14:creationId xmlns:p14="http://schemas.microsoft.com/office/powerpoint/2010/main" val="577823426"/>
+      </p:ext>
+    </p:extLst>
+  </p:cSld>
+  <p:clrMapOvr>
+    <a:masterClrMapping/>
+  </p:clrMapOvr>
+</p:sld>
+</file>
+
+<file path=ppt/slides/slide8.xml><?xml version="1.0" encoding="utf-8"?>
+<p:sld xmlns:a="http://schemas.openxmlformats.org/drawingml/2006/main" xmlns:r="http://schemas.openxmlformats.org/officeDocument/2006/relationships" xmlns:p="http://schemas.openxmlformats.org/presentationml/2006/main">
+  <p:cSld>
+    <p:spTree>
+      <p:nvGrpSpPr>
+        <p:cNvPr id="1" name=""/>
+        <p:cNvGrpSpPr/>
+        <p:nvPr/>
+      </p:nvGrpSpPr>
+      <p:grpSpPr>
+        <a:xfrm>
+          <a:off x="0" y="0"/>
+          <a:ext cx="0" cy="0"/>
+          <a:chOff x="0" y="0"/>
+          <a:chExt cx="0" cy="0"/>
+        </a:xfrm>
+      </p:grpSpPr>
+      <p:sp>
+        <p:nvSpPr>
+          <p:cNvPr id="2" name="标题 1">
+            <a:extLst>
+              <a:ext uri="{FF2B5EF4-FFF2-40B4-BE49-F238E27FC236}">
+                <a16:creationId xmlns:a16="http://schemas.microsoft.com/office/drawing/2014/main" id="{9E326CDC-4E0F-429F-8DB3-F845B50364E9}"/>
+              </a:ext>
+            </a:extLst>
+          </p:cNvPr>
+          <p:cNvSpPr>
+            <a:spLocks noGrp="1"/>
+          </p:cNvSpPr>
+          <p:nvPr>
+            <p:ph type="title"/>
+          </p:nvPr>
+        </p:nvSpPr>
+        <p:spPr/>
+        <p:txBody>
+          <a:bodyPr/>
+          <a:lstStyle/>
+          <a:p>
+            <a:endParaRPr lang="zh-CN" altLang="en-US"/>
+          </a:p>
+        </p:txBody>
+      </p:sp>
+      <p:pic>
+        <p:nvPicPr>
+          <p:cNvPr id="5" name="内容占位符 4">
+            <a:extLst>
+              <a:ext uri="{FF2B5EF4-FFF2-40B4-BE49-F238E27FC236}">
+                <a16:creationId xmlns:a16="http://schemas.microsoft.com/office/drawing/2014/main" id="{43FD8D37-2EAB-4D33-89A8-E86FEEC44E47}"/>
+              </a:ext>
+            </a:extLst>
+          </p:cNvPr>
+          <p:cNvPicPr>
+            <a:picLocks noGrp="1" noChangeAspect="1"/>
+          </p:cNvPicPr>
+          <p:nvPr>
+            <p:ph idx="1"/>
+          </p:nvPr>
+        </p:nvPicPr>
+        <p:blipFill>
+          <a:blip r:embed="rId2" cstate="print">
+            <a:extLst>
+              <a:ext uri="{28A0092B-C50C-407E-A947-70E740481C1C}">
+                <a14:useLocalDpi xmlns:a14="http://schemas.microsoft.com/office/drawing/2010/main" val="0"/>
+              </a:ext>
+            </a:extLst>
+          </a:blip>
+          <a:stretch>
+            <a:fillRect/>
+          </a:stretch>
+        </p:blipFill>
+        <p:spPr>
+          <a:xfrm>
+            <a:off x="3299709" y="1600200"/>
+            <a:ext cx="2544581" cy="4525963"/>
+          </a:xfrm>
+        </p:spPr>
+      </p:pic>
+    </p:spTree>
+    <p:extLst>
+      <p:ext uri="{BB962C8B-B14F-4D97-AF65-F5344CB8AC3E}">
+        <p14:creationId xmlns:p14="http://schemas.microsoft.com/office/powerpoint/2010/main" val="1219244140"/>
+      </p:ext>
+    </p:extLst>
+  </p:cSld>
+  <p:clrMapOvr>
+    <a:masterClrMapping/>
+  </p:clrMapOvr>
+</p:sld>
+</file>
+
+<file path=ppt/slides/slide9.xml><?xml version="1.0" encoding="utf-8"?>
+<p:sld xmlns:a="http://schemas.openxmlformats.org/drawingml/2006/main" xmlns:r="http://schemas.openxmlformats.org/officeDocument/2006/relationships" xmlns:p="http://schemas.openxmlformats.org/presentationml/2006/main">
+  <p:cSld>
+    <p:spTree>
+      <p:nvGrpSpPr>
+        <p:cNvPr id="1" name=""/>
+        <p:cNvGrpSpPr/>
+        <p:nvPr/>
+      </p:nvGrpSpPr>
+      <p:grpSpPr>
+        <a:xfrm>
+          <a:off x="0" y="0"/>
+          <a:ext cx="0" cy="0"/>
+          <a:chOff x="0" y="0"/>
+          <a:chExt cx="0" cy="0"/>
+        </a:xfrm>
+      </p:grpSpPr>
+      <p:sp>
+        <p:nvSpPr>
+          <p:cNvPr id="2" name="标题 1">
+            <a:extLst>
+              <a:ext uri="{FF2B5EF4-FFF2-40B4-BE49-F238E27FC236}">
+                <a16:creationId xmlns:a16="http://schemas.microsoft.com/office/drawing/2014/main" id="{08BF7BFA-F7BC-4A08-B703-BFA24DB60F26}"/>
+              </a:ext>
+            </a:extLst>
+          </p:cNvPr>
+          <p:cNvSpPr>
+            <a:spLocks noGrp="1"/>
+          </p:cNvSpPr>
+          <p:nvPr>
+            <p:ph type="title"/>
+          </p:nvPr>
+        </p:nvSpPr>
+        <p:spPr/>
+        <p:txBody>
+          <a:bodyPr/>
+          <a:lstStyle/>
+          <a:p>
+            <a:endParaRPr lang="zh-CN" altLang="en-US"/>
+          </a:p>
+        </p:txBody>
+      </p:sp>
+      <p:pic>
+        <p:nvPicPr>
+          <p:cNvPr id="5" name="内容占位符 4">
+            <a:extLst>
+              <a:ext uri="{FF2B5EF4-FFF2-40B4-BE49-F238E27FC236}">
+                <a16:creationId xmlns:a16="http://schemas.microsoft.com/office/drawing/2014/main" id="{B671A02C-B452-48A1-BFAB-E610B476CA4E}"/>
+              </a:ext>
+            </a:extLst>
+          </p:cNvPr>
+          <p:cNvPicPr>
+            <a:picLocks noGrp="1" noChangeAspect="1"/>
+          </p:cNvPicPr>
+          <p:nvPr>
+            <p:ph idx="1"/>
+          </p:nvPr>
+        </p:nvPicPr>
+        <p:blipFill>
+          <a:blip r:embed="rId2" cstate="print">
+            <a:extLst>
+              <a:ext uri="{28A0092B-C50C-407E-A947-70E740481C1C}">
+                <a14:useLocalDpi xmlns:a14="http://schemas.microsoft.com/office/drawing/2010/main" val="0"/>
+              </a:ext>
+            </a:extLst>
+          </a:blip>
+          <a:stretch>
+            <a:fillRect/>
+          </a:stretch>
+        </p:blipFill>
+        <p:spPr>
+          <a:xfrm>
+            <a:off x="3299709" y="1600200"/>
+            <a:ext cx="2544581" cy="4525963"/>
+          </a:xfrm>
+        </p:spPr>
+      </p:pic>
+    </p:spTree>
+    <p:extLst>
+      <p:ext uri="{BB962C8B-B14F-4D97-AF65-F5344CB8AC3E}">
+        <p14:creationId xmlns:p14="http://schemas.microsoft.com/office/powerpoint/2010/main" val="3345519659"/>
       </p:ext>
     </p:extLst>
   </p:cSld>

</xml_diff>